<commit_message>
create up to id-42
</commit_message>
<xml_diff>
--- a/markers/Aruco_6x6_250.pptx
+++ b/markers/Aruco_6x6_250.pptx
@@ -6,6 +6,7 @@
   </p:sldMasterIdLst>
   <p:sldIdLst>
     <p:sldId id="256" r:id="rId2"/>
+    <p:sldId id="257" r:id="rId3"/>
   </p:sldIdLst>
   <p:sldSz cx="9906000" cy="6858000" type="A4"/>
   <p:notesSz cx="6858000" cy="9144000"/>
@@ -104,6 +105,11 @@
       </a:defRPr>
     </a:lvl9pPr>
   </p:defaultTextStyle>
+  <p:extLst>
+    <p:ext uri="{EFAFB233-063F-42B5-8137-9DF3F51BA10A}">
+      <p15:sldGuideLst xmlns:p15="http://schemas.microsoft.com/office/powerpoint/2012/main"/>
+    </p:ext>
+  </p:extLst>
 </p:presentation>
 </file>
 
@@ -238,7 +244,7 @@
           <a:p>
             <a:fld id="{7B826795-27B0-4B2A-A2D0-7F269F4A6704}" type="datetimeFigureOut">
               <a:rPr lang="en-US" smtClean="0"/>
-              <a:t>8/24/2023</a:t>
+              <a:t>9/3/2023</a:t>
             </a:fld>
             <a:endParaRPr lang="en-US"/>
           </a:p>
@@ -408,7 +414,7 @@
           <a:p>
             <a:fld id="{7B826795-27B0-4B2A-A2D0-7F269F4A6704}" type="datetimeFigureOut">
               <a:rPr lang="en-US" smtClean="0"/>
-              <a:t>8/24/2023</a:t>
+              <a:t>9/3/2023</a:t>
             </a:fld>
             <a:endParaRPr lang="en-US"/>
           </a:p>
@@ -588,7 +594,7 @@
           <a:p>
             <a:fld id="{7B826795-27B0-4B2A-A2D0-7F269F4A6704}" type="datetimeFigureOut">
               <a:rPr lang="en-US" smtClean="0"/>
-              <a:t>8/24/2023</a:t>
+              <a:t>9/3/2023</a:t>
             </a:fld>
             <a:endParaRPr lang="en-US"/>
           </a:p>
@@ -758,7 +764,7 @@
           <a:p>
             <a:fld id="{7B826795-27B0-4B2A-A2D0-7F269F4A6704}" type="datetimeFigureOut">
               <a:rPr lang="en-US" smtClean="0"/>
-              <a:t>8/24/2023</a:t>
+              <a:t>9/3/2023</a:t>
             </a:fld>
             <a:endParaRPr lang="en-US"/>
           </a:p>
@@ -1002,7 +1008,7 @@
           <a:p>
             <a:fld id="{7B826795-27B0-4B2A-A2D0-7F269F4A6704}" type="datetimeFigureOut">
               <a:rPr lang="en-US" smtClean="0"/>
-              <a:t>8/24/2023</a:t>
+              <a:t>9/3/2023</a:t>
             </a:fld>
             <a:endParaRPr lang="en-US"/>
           </a:p>
@@ -1234,7 +1240,7 @@
           <a:p>
             <a:fld id="{7B826795-27B0-4B2A-A2D0-7F269F4A6704}" type="datetimeFigureOut">
               <a:rPr lang="en-US" smtClean="0"/>
-              <a:t>8/24/2023</a:t>
+              <a:t>9/3/2023</a:t>
             </a:fld>
             <a:endParaRPr lang="en-US"/>
           </a:p>
@@ -1601,7 +1607,7 @@
           <a:p>
             <a:fld id="{7B826795-27B0-4B2A-A2D0-7F269F4A6704}" type="datetimeFigureOut">
               <a:rPr lang="en-US" smtClean="0"/>
-              <a:t>8/24/2023</a:t>
+              <a:t>9/3/2023</a:t>
             </a:fld>
             <a:endParaRPr lang="en-US"/>
           </a:p>
@@ -1719,7 +1725,7 @@
           <a:p>
             <a:fld id="{7B826795-27B0-4B2A-A2D0-7F269F4A6704}" type="datetimeFigureOut">
               <a:rPr lang="en-US" smtClean="0"/>
-              <a:t>8/24/2023</a:t>
+              <a:t>9/3/2023</a:t>
             </a:fld>
             <a:endParaRPr lang="en-US"/>
           </a:p>
@@ -1814,7 +1820,7 @@
           <a:p>
             <a:fld id="{7B826795-27B0-4B2A-A2D0-7F269F4A6704}" type="datetimeFigureOut">
               <a:rPr lang="en-US" smtClean="0"/>
-              <a:t>8/24/2023</a:t>
+              <a:t>9/3/2023</a:t>
             </a:fld>
             <a:endParaRPr lang="en-US"/>
           </a:p>
@@ -2091,7 +2097,7 @@
           <a:p>
             <a:fld id="{7B826795-27B0-4B2A-A2D0-7F269F4A6704}" type="datetimeFigureOut">
               <a:rPr lang="en-US" smtClean="0"/>
-              <a:t>8/24/2023</a:t>
+              <a:t>9/3/2023</a:t>
             </a:fld>
             <a:endParaRPr lang="en-US"/>
           </a:p>
@@ -2348,7 +2354,7 @@
           <a:p>
             <a:fld id="{7B826795-27B0-4B2A-A2D0-7F269F4A6704}" type="datetimeFigureOut">
               <a:rPr lang="en-US" smtClean="0"/>
-              <a:t>8/24/2023</a:t>
+              <a:t>9/3/2023</a:t>
             </a:fld>
             <a:endParaRPr lang="en-US"/>
           </a:p>
@@ -2561,7 +2567,7 @@
           <a:p>
             <a:fld id="{7B826795-27B0-4B2A-A2D0-7F269F4A6704}" type="datetimeFigureOut">
               <a:rPr lang="en-US" smtClean="0"/>
-              <a:t>8/24/2023</a:t>
+              <a:t>9/3/2023</a:t>
             </a:fld>
             <a:endParaRPr lang="en-US"/>
           </a:p>
@@ -3219,7 +3225,7 @@
                   </a:schemeClr>
                 </a:solidFill>
               </a:rPr>
-              <a:t>1</a:t>
+              <a:t>0</a:t>
             </a:r>
           </a:p>
         </p:txBody>
@@ -3261,7 +3267,7 @@
                   </a:schemeClr>
                 </a:solidFill>
               </a:rPr>
-              <a:t>2</a:t>
+              <a:t>1</a:t>
             </a:r>
           </a:p>
         </p:txBody>
@@ -3303,7 +3309,7 @@
                   </a:schemeClr>
                 </a:solidFill>
               </a:rPr>
-              <a:t>3</a:t>
+              <a:t>2</a:t>
             </a:r>
           </a:p>
         </p:txBody>
@@ -3345,7 +3351,7 @@
                   </a:schemeClr>
                 </a:solidFill>
               </a:rPr>
-              <a:t>4</a:t>
+              <a:t>3</a:t>
             </a:r>
           </a:p>
         </p:txBody>
@@ -3387,7 +3393,7 @@
                   </a:schemeClr>
                 </a:solidFill>
               </a:rPr>
-              <a:t>5</a:t>
+              <a:t>4</a:t>
             </a:r>
           </a:p>
         </p:txBody>
@@ -3429,7 +3435,7 @@
                   </a:schemeClr>
                 </a:solidFill>
               </a:rPr>
-              <a:t>6</a:t>
+              <a:t>5</a:t>
             </a:r>
           </a:p>
         </p:txBody>
@@ -3438,6 +3444,504 @@
     <p:extLst>
       <p:ext uri="{BB962C8B-B14F-4D97-AF65-F5344CB8AC3E}">
         <p14:creationId xmlns:p14="http://schemas.microsoft.com/office/powerpoint/2010/main" val="2487481649"/>
+      </p:ext>
+    </p:extLst>
+  </p:cSld>
+  <p:clrMapOvr>
+    <a:masterClrMapping/>
+  </p:clrMapOvr>
+</p:sld>
+</file>
+
+<file path=ppt/slides/slide2.xml><?xml version="1.0" encoding="utf-8"?>
+<p:sld xmlns:a="http://schemas.openxmlformats.org/drawingml/2006/main" xmlns:r="http://schemas.openxmlformats.org/officeDocument/2006/relationships" xmlns:p="http://schemas.openxmlformats.org/presentationml/2006/main">
+  <p:cSld>
+    <p:spTree>
+      <p:nvGrpSpPr>
+        <p:cNvPr id="1" name=""/>
+        <p:cNvGrpSpPr/>
+        <p:nvPr/>
+      </p:nvGrpSpPr>
+      <p:grpSpPr>
+        <a:xfrm>
+          <a:off x="0" y="0"/>
+          <a:ext cx="0" cy="0"/>
+          <a:chOff x="0" y="0"/>
+          <a:chExt cx="0" cy="0"/>
+        </a:xfrm>
+      </p:grpSpPr>
+      <p:pic>
+        <p:nvPicPr>
+          <p:cNvPr id="27" name="Picture 26">
+            <a:extLst>
+              <a:ext uri="{FF2B5EF4-FFF2-40B4-BE49-F238E27FC236}">
+                <a16:creationId xmlns:a16="http://schemas.microsoft.com/office/drawing/2014/main" id="{4EAADDC6-703E-47D2-8D2B-09019786D927}"/>
+              </a:ext>
+            </a:extLst>
+          </p:cNvPr>
+          <p:cNvPicPr>
+            <a:picLocks noChangeAspect="1"/>
+          </p:cNvPicPr>
+          <p:nvPr/>
+        </p:nvPicPr>
+        <p:blipFill>
+          <a:blip r:embed="rId2">
+            <a:extLst>
+              <a:ext uri="{28A0092B-C50C-407E-A947-70E740481C1C}">
+                <a14:useLocalDpi xmlns:a14="http://schemas.microsoft.com/office/drawing/2010/main" val="0"/>
+              </a:ext>
+            </a:extLst>
+          </a:blip>
+          <a:stretch>
+            <a:fillRect/>
+          </a:stretch>
+        </p:blipFill>
+        <p:spPr>
+          <a:xfrm>
+            <a:off x="271221" y="375295"/>
+            <a:ext cx="2736000" cy="2736000"/>
+          </a:xfrm>
+          <a:prstGeom prst="rect">
+            <a:avLst/>
+          </a:prstGeom>
+        </p:spPr>
+      </p:pic>
+      <p:pic>
+        <p:nvPicPr>
+          <p:cNvPr id="29" name="Picture 28">
+            <a:extLst>
+              <a:ext uri="{FF2B5EF4-FFF2-40B4-BE49-F238E27FC236}">
+                <a16:creationId xmlns:a16="http://schemas.microsoft.com/office/drawing/2014/main" id="{40F1555C-B0E1-4FBC-B294-4EB8A2AB7F4B}"/>
+              </a:ext>
+            </a:extLst>
+          </p:cNvPr>
+          <p:cNvPicPr>
+            <a:picLocks noChangeAspect="1"/>
+          </p:cNvPicPr>
+          <p:nvPr/>
+        </p:nvPicPr>
+        <p:blipFill>
+          <a:blip r:embed="rId3">
+            <a:extLst>
+              <a:ext uri="{28A0092B-C50C-407E-A947-70E740481C1C}">
+                <a14:useLocalDpi xmlns:a14="http://schemas.microsoft.com/office/drawing/2010/main" val="0"/>
+              </a:ext>
+            </a:extLst>
+          </a:blip>
+          <a:stretch>
+            <a:fillRect/>
+          </a:stretch>
+        </p:blipFill>
+        <p:spPr>
+          <a:xfrm>
+            <a:off x="271221" y="3746705"/>
+            <a:ext cx="2736000" cy="2736000"/>
+          </a:xfrm>
+          <a:prstGeom prst="rect">
+            <a:avLst/>
+          </a:prstGeom>
+        </p:spPr>
+      </p:pic>
+      <p:pic>
+        <p:nvPicPr>
+          <p:cNvPr id="31" name="Picture 30">
+            <a:extLst>
+              <a:ext uri="{FF2B5EF4-FFF2-40B4-BE49-F238E27FC236}">
+                <a16:creationId xmlns:a16="http://schemas.microsoft.com/office/drawing/2014/main" id="{3E1EBB28-D304-4EB9-8E12-6186FA8E93A7}"/>
+              </a:ext>
+            </a:extLst>
+          </p:cNvPr>
+          <p:cNvPicPr>
+            <a:picLocks noChangeAspect="1"/>
+          </p:cNvPicPr>
+          <p:nvPr/>
+        </p:nvPicPr>
+        <p:blipFill>
+          <a:blip r:embed="rId4">
+            <a:extLst>
+              <a:ext uri="{28A0092B-C50C-407E-A947-70E740481C1C}">
+                <a14:useLocalDpi xmlns:a14="http://schemas.microsoft.com/office/drawing/2010/main" val="0"/>
+              </a:ext>
+            </a:extLst>
+          </a:blip>
+          <a:stretch>
+            <a:fillRect/>
+          </a:stretch>
+        </p:blipFill>
+        <p:spPr>
+          <a:xfrm>
+            <a:off x="3565092" y="375295"/>
+            <a:ext cx="2736000" cy="2736000"/>
+          </a:xfrm>
+          <a:prstGeom prst="rect">
+            <a:avLst/>
+          </a:prstGeom>
+        </p:spPr>
+      </p:pic>
+      <p:pic>
+        <p:nvPicPr>
+          <p:cNvPr id="33" name="Picture 32">
+            <a:extLst>
+              <a:ext uri="{FF2B5EF4-FFF2-40B4-BE49-F238E27FC236}">
+                <a16:creationId xmlns:a16="http://schemas.microsoft.com/office/drawing/2014/main" id="{FF06F0BF-37FD-46E0-83DC-15BF109F7244}"/>
+              </a:ext>
+            </a:extLst>
+          </p:cNvPr>
+          <p:cNvPicPr>
+            <a:picLocks noChangeAspect="1"/>
+          </p:cNvPicPr>
+          <p:nvPr/>
+        </p:nvPicPr>
+        <p:blipFill>
+          <a:blip r:embed="rId5">
+            <a:extLst>
+              <a:ext uri="{28A0092B-C50C-407E-A947-70E740481C1C}">
+                <a14:useLocalDpi xmlns:a14="http://schemas.microsoft.com/office/drawing/2010/main" val="0"/>
+              </a:ext>
+            </a:extLst>
+          </a:blip>
+          <a:stretch>
+            <a:fillRect/>
+          </a:stretch>
+        </p:blipFill>
+        <p:spPr>
+          <a:xfrm>
+            <a:off x="3565092" y="3746705"/>
+            <a:ext cx="2736000" cy="2736000"/>
+          </a:xfrm>
+          <a:prstGeom prst="rect">
+            <a:avLst/>
+          </a:prstGeom>
+        </p:spPr>
+      </p:pic>
+      <p:pic>
+        <p:nvPicPr>
+          <p:cNvPr id="35" name="Picture 34">
+            <a:extLst>
+              <a:ext uri="{FF2B5EF4-FFF2-40B4-BE49-F238E27FC236}">
+                <a16:creationId xmlns:a16="http://schemas.microsoft.com/office/drawing/2014/main" id="{D23D31FE-56EA-448D-953E-BF31F0F74470}"/>
+              </a:ext>
+            </a:extLst>
+          </p:cNvPr>
+          <p:cNvPicPr>
+            <a:picLocks noChangeAspect="1"/>
+          </p:cNvPicPr>
+          <p:nvPr/>
+        </p:nvPicPr>
+        <p:blipFill>
+          <a:blip r:embed="rId6">
+            <a:extLst>
+              <a:ext uri="{28A0092B-C50C-407E-A947-70E740481C1C}">
+                <a14:useLocalDpi xmlns:a14="http://schemas.microsoft.com/office/drawing/2010/main" val="0"/>
+              </a:ext>
+            </a:extLst>
+          </a:blip>
+          <a:stretch>
+            <a:fillRect/>
+          </a:stretch>
+        </p:blipFill>
+        <p:spPr>
+          <a:xfrm>
+            <a:off x="6858963" y="375295"/>
+            <a:ext cx="2736000" cy="2736000"/>
+          </a:xfrm>
+          <a:prstGeom prst="rect">
+            <a:avLst/>
+          </a:prstGeom>
+        </p:spPr>
+      </p:pic>
+      <p:pic>
+        <p:nvPicPr>
+          <p:cNvPr id="37" name="Picture 36">
+            <a:extLst>
+              <a:ext uri="{FF2B5EF4-FFF2-40B4-BE49-F238E27FC236}">
+                <a16:creationId xmlns:a16="http://schemas.microsoft.com/office/drawing/2014/main" id="{DFF4AD27-0CC0-498F-A7C5-B3BA0AE105BA}"/>
+              </a:ext>
+            </a:extLst>
+          </p:cNvPr>
+          <p:cNvPicPr>
+            <a:picLocks noChangeAspect="1"/>
+          </p:cNvPicPr>
+          <p:nvPr/>
+        </p:nvPicPr>
+        <p:blipFill>
+          <a:blip r:embed="rId7">
+            <a:extLst>
+              <a:ext uri="{28A0092B-C50C-407E-A947-70E740481C1C}">
+                <a14:useLocalDpi xmlns:a14="http://schemas.microsoft.com/office/drawing/2010/main" val="0"/>
+              </a:ext>
+            </a:extLst>
+          </a:blip>
+          <a:stretch>
+            <a:fillRect/>
+          </a:stretch>
+        </p:blipFill>
+        <p:spPr>
+          <a:xfrm>
+            <a:off x="6858963" y="3746705"/>
+            <a:ext cx="2736000" cy="2736000"/>
+          </a:xfrm>
+          <a:prstGeom prst="rect">
+            <a:avLst/>
+          </a:prstGeom>
+        </p:spPr>
+      </p:pic>
+      <p:sp>
+        <p:nvSpPr>
+          <p:cNvPr id="16" name="TextBox 15">
+            <a:extLst>
+              <a:ext uri="{FF2B5EF4-FFF2-40B4-BE49-F238E27FC236}">
+                <a16:creationId xmlns:a16="http://schemas.microsoft.com/office/drawing/2014/main" id="{621CD06A-1EDB-4397-8648-64B4C2BAB2F3}"/>
+              </a:ext>
+            </a:extLst>
+          </p:cNvPr>
+          <p:cNvSpPr txBox="1"/>
+          <p:nvPr/>
+        </p:nvSpPr>
+        <p:spPr>
+          <a:xfrm>
+            <a:off x="271221" y="375295"/>
+            <a:ext cx="480048" cy="369332"/>
+          </a:xfrm>
+          <a:prstGeom prst="rect">
+            <a:avLst/>
+          </a:prstGeom>
+          <a:noFill/>
+        </p:spPr>
+        <p:txBody>
+          <a:bodyPr wrap="square" rtlCol="0">
+            <a:spAutoFit/>
+          </a:bodyPr>
+          <a:lstStyle/>
+          <a:p>
+            <a:r>
+              <a:rPr lang="en-US" dirty="0">
+                <a:solidFill>
+                  <a:schemeClr val="tx1">
+                    <a:lumMod val="50000"/>
+                    <a:lumOff val="50000"/>
+                  </a:schemeClr>
+                </a:solidFill>
+              </a:rPr>
+              <a:t>35</a:t>
+            </a:r>
+          </a:p>
+        </p:txBody>
+      </p:sp>
+      <p:sp>
+        <p:nvSpPr>
+          <p:cNvPr id="38" name="TextBox 37">
+            <a:extLst>
+              <a:ext uri="{FF2B5EF4-FFF2-40B4-BE49-F238E27FC236}">
+                <a16:creationId xmlns:a16="http://schemas.microsoft.com/office/drawing/2014/main" id="{F5DFD565-CE77-4490-A7E2-61F58576219C}"/>
+              </a:ext>
+            </a:extLst>
+          </p:cNvPr>
+          <p:cNvSpPr txBox="1"/>
+          <p:nvPr/>
+        </p:nvSpPr>
+        <p:spPr>
+          <a:xfrm>
+            <a:off x="271221" y="3724540"/>
+            <a:ext cx="480048" cy="369332"/>
+          </a:xfrm>
+          <a:prstGeom prst="rect">
+            <a:avLst/>
+          </a:prstGeom>
+          <a:noFill/>
+        </p:spPr>
+        <p:txBody>
+          <a:bodyPr wrap="square" rtlCol="0">
+            <a:spAutoFit/>
+          </a:bodyPr>
+          <a:lstStyle/>
+          <a:p>
+            <a:r>
+              <a:rPr lang="en-US" dirty="0">
+                <a:solidFill>
+                  <a:schemeClr val="tx1">
+                    <a:lumMod val="50000"/>
+                    <a:lumOff val="50000"/>
+                  </a:schemeClr>
+                </a:solidFill>
+              </a:rPr>
+              <a:t>36</a:t>
+            </a:r>
+          </a:p>
+        </p:txBody>
+      </p:sp>
+      <p:sp>
+        <p:nvSpPr>
+          <p:cNvPr id="39" name="TextBox 38">
+            <a:extLst>
+              <a:ext uri="{FF2B5EF4-FFF2-40B4-BE49-F238E27FC236}">
+                <a16:creationId xmlns:a16="http://schemas.microsoft.com/office/drawing/2014/main" id="{90167EB4-C64F-4C93-8E08-0394B354528C}"/>
+              </a:ext>
+            </a:extLst>
+          </p:cNvPr>
+          <p:cNvSpPr txBox="1"/>
+          <p:nvPr/>
+        </p:nvSpPr>
+        <p:spPr>
+          <a:xfrm>
+            <a:off x="3578437" y="375295"/>
+            <a:ext cx="480048" cy="369332"/>
+          </a:xfrm>
+          <a:prstGeom prst="rect">
+            <a:avLst/>
+          </a:prstGeom>
+          <a:noFill/>
+        </p:spPr>
+        <p:txBody>
+          <a:bodyPr wrap="square" rtlCol="0">
+            <a:spAutoFit/>
+          </a:bodyPr>
+          <a:lstStyle/>
+          <a:p>
+            <a:r>
+              <a:rPr lang="en-US" dirty="0">
+                <a:solidFill>
+                  <a:schemeClr val="tx1">
+                    <a:lumMod val="50000"/>
+                    <a:lumOff val="50000"/>
+                  </a:schemeClr>
+                </a:solidFill>
+              </a:rPr>
+              <a:t>37</a:t>
+            </a:r>
+          </a:p>
+        </p:txBody>
+      </p:sp>
+      <p:sp>
+        <p:nvSpPr>
+          <p:cNvPr id="40" name="TextBox 39">
+            <a:extLst>
+              <a:ext uri="{FF2B5EF4-FFF2-40B4-BE49-F238E27FC236}">
+                <a16:creationId xmlns:a16="http://schemas.microsoft.com/office/drawing/2014/main" id="{9A39AB7F-A629-4516-B6A9-8D0895C010A4}"/>
+              </a:ext>
+            </a:extLst>
+          </p:cNvPr>
+          <p:cNvSpPr txBox="1"/>
+          <p:nvPr/>
+        </p:nvSpPr>
+        <p:spPr>
+          <a:xfrm>
+            <a:off x="3578437" y="3740631"/>
+            <a:ext cx="480048" cy="369332"/>
+          </a:xfrm>
+          <a:prstGeom prst="rect">
+            <a:avLst/>
+          </a:prstGeom>
+          <a:noFill/>
+        </p:spPr>
+        <p:txBody>
+          <a:bodyPr wrap="square" rtlCol="0">
+            <a:spAutoFit/>
+          </a:bodyPr>
+          <a:lstStyle/>
+          <a:p>
+            <a:r>
+              <a:rPr lang="en-US" dirty="0">
+                <a:solidFill>
+                  <a:schemeClr val="tx1">
+                    <a:lumMod val="50000"/>
+                    <a:lumOff val="50000"/>
+                  </a:schemeClr>
+                </a:solidFill>
+              </a:rPr>
+              <a:t>38</a:t>
+            </a:r>
+          </a:p>
+        </p:txBody>
+      </p:sp>
+      <p:sp>
+        <p:nvSpPr>
+          <p:cNvPr id="41" name="TextBox 40">
+            <a:extLst>
+              <a:ext uri="{FF2B5EF4-FFF2-40B4-BE49-F238E27FC236}">
+                <a16:creationId xmlns:a16="http://schemas.microsoft.com/office/drawing/2014/main" id="{BABFFBA7-BE45-4BEF-8997-BEA5C559ED73}"/>
+              </a:ext>
+            </a:extLst>
+          </p:cNvPr>
+          <p:cNvSpPr txBox="1"/>
+          <p:nvPr/>
+        </p:nvSpPr>
+        <p:spPr>
+          <a:xfrm>
+            <a:off x="6854834" y="375295"/>
+            <a:ext cx="480048" cy="369332"/>
+          </a:xfrm>
+          <a:prstGeom prst="rect">
+            <a:avLst/>
+          </a:prstGeom>
+          <a:noFill/>
+        </p:spPr>
+        <p:txBody>
+          <a:bodyPr wrap="square" rtlCol="0">
+            <a:spAutoFit/>
+          </a:bodyPr>
+          <a:lstStyle/>
+          <a:p>
+            <a:r>
+              <a:rPr lang="en-US" dirty="0">
+                <a:solidFill>
+                  <a:schemeClr val="tx1">
+                    <a:lumMod val="50000"/>
+                    <a:lumOff val="50000"/>
+                  </a:schemeClr>
+                </a:solidFill>
+              </a:rPr>
+              <a:t>39</a:t>
+            </a:r>
+          </a:p>
+        </p:txBody>
+      </p:sp>
+      <p:sp>
+        <p:nvSpPr>
+          <p:cNvPr id="42" name="TextBox 41">
+            <a:extLst>
+              <a:ext uri="{FF2B5EF4-FFF2-40B4-BE49-F238E27FC236}">
+                <a16:creationId xmlns:a16="http://schemas.microsoft.com/office/drawing/2014/main" id="{3EBB9E13-7742-4627-A256-39233B90ABE2}"/>
+              </a:ext>
+            </a:extLst>
+          </p:cNvPr>
+          <p:cNvSpPr txBox="1"/>
+          <p:nvPr/>
+        </p:nvSpPr>
+        <p:spPr>
+          <a:xfrm>
+            <a:off x="6850705" y="3750334"/>
+            <a:ext cx="480048" cy="369332"/>
+          </a:xfrm>
+          <a:prstGeom prst="rect">
+            <a:avLst/>
+          </a:prstGeom>
+          <a:noFill/>
+        </p:spPr>
+        <p:txBody>
+          <a:bodyPr wrap="square" rtlCol="0">
+            <a:spAutoFit/>
+          </a:bodyPr>
+          <a:lstStyle/>
+          <a:p>
+            <a:r>
+              <a:rPr lang="en-US" dirty="0">
+                <a:solidFill>
+                  <a:schemeClr val="tx1">
+                    <a:lumMod val="50000"/>
+                    <a:lumOff val="50000"/>
+                  </a:schemeClr>
+                </a:solidFill>
+              </a:rPr>
+              <a:t>40</a:t>
+            </a:r>
+          </a:p>
+        </p:txBody>
+      </p:sp>
+    </p:spTree>
+    <p:extLst>
+      <p:ext uri="{BB962C8B-B14F-4D97-AF65-F5344CB8AC3E}">
+        <p14:creationId xmlns:p14="http://schemas.microsoft.com/office/powerpoint/2010/main" val="857312606"/>
       </p:ext>
     </p:extLst>
   </p:cSld>

</xml_diff>